<commit_message>
added histogram to the deep dive page
</commit_message>
<xml_diff>
--- a/Better Together CCC NYC.pptx
+++ b/Better Together CCC NYC.pptx
@@ -11,10 +11,11 @@
     <p:sldId id="260" r:id="rId5"/>
     <p:sldId id="262" r:id="rId6"/>
     <p:sldId id="263" r:id="rId7"/>
-    <p:sldId id="264" r:id="rId8"/>
-    <p:sldId id="265" r:id="rId9"/>
-    <p:sldId id="266" r:id="rId10"/>
-    <p:sldId id="257" r:id="rId11"/>
+    <p:sldId id="267" r:id="rId8"/>
+    <p:sldId id="264" r:id="rId9"/>
+    <p:sldId id="265" r:id="rId10"/>
+    <p:sldId id="266" r:id="rId11"/>
+    <p:sldId id="268" r:id="rId12"/>
   </p:sldIdLst>
   <p:sldSz cx="12192000" cy="6858000"/>
   <p:notesSz cx="6858000" cy="9144000"/>
@@ -113,13 +114,30 @@
       </a:defRPr>
     </a:lvl9pPr>
   </p:defaultTextStyle>
+  <p:extLst>
+    <p:ext uri="{EFAFB233-063F-42B5-8137-9DF3F51BA10A}">
+      <p15:sldGuideLst xmlns:p15="http://schemas.microsoft.com/office/powerpoint/2012/main"/>
+    </p:ext>
+  </p:extLst>
 </p:presentation>
+</file>
+
+<file path=ppt/commentAuthors.xml><?xml version="1.0" encoding="utf-8"?>
+<p:cmAuthorLst xmlns:a="http://schemas.openxmlformats.org/drawingml/2006/main" xmlns:r="http://schemas.openxmlformats.org/officeDocument/2006/relationships" xmlns:p="http://schemas.openxmlformats.org/presentationml/2006/main">
+  <p:cmAuthor id="1" name="Jason Wattier" initials="JW" lastIdx="1" clrIdx="0">
+    <p:extLst>
+      <p:ext uri="{19B8F6BF-5375-455C-9EA6-DF929625EA0E}">
+        <p15:presenceInfo xmlns:p15="http://schemas.microsoft.com/office/powerpoint/2012/main" userId="de6cb9e11468ad32" providerId="Windows Live"/>
+      </p:ext>
+    </p:extLst>
+  </p:cmAuthor>
+</p:cmAuthorLst>
 </file>
 
 <file path=ppt/revisionInfo.xml><?xml version="1.0" encoding="utf-8"?>
 <p1510:revInfo xmlns:a="http://schemas.openxmlformats.org/drawingml/2006/main" xmlns:r="http://schemas.openxmlformats.org/officeDocument/2006/relationships" xmlns:p1510="http://schemas.microsoft.com/office/powerpoint/2015/10/main">
   <p1510:revLst>
-    <p1510:client id="{ED1BF63C-F5A7-4498-8573-2BF7C6162C2B}" v="8" dt="2020-03-27T03:10:03.945"/>
+    <p1510:client id="{ED1BF63C-F5A7-4498-8573-2BF7C6162C2B}" v="15" dt="2020-03-27T07:20:38.120"/>
   </p1510:revLst>
 </p1510:revInfo>
 </file>
@@ -128,19 +146,134 @@
 <pc:chgInfo xmlns:a="http://schemas.openxmlformats.org/drawingml/2006/main" xmlns:r="http://schemas.openxmlformats.org/officeDocument/2006/relationships" xmlns:ac="http://schemas.microsoft.com/office/drawing/2013/main/command" xmlns:pc="http://schemas.microsoft.com/office/powerpoint/2013/main/command">
   <pc:docChgLst>
     <pc:chgData name="Jason Wattier" userId="de6cb9e11468ad32" providerId="LiveId" clId="{ED1BF63C-F5A7-4498-8573-2BF7C6162C2B}"/>
-    <pc:docChg chg="custSel addSld delSld modSld">
-      <pc:chgData name="Jason Wattier" userId="de6cb9e11468ad32" providerId="LiveId" clId="{ED1BF63C-F5A7-4498-8573-2BF7C6162C2B}" dt="2020-03-27T03:11:09.998" v="625" actId="20577"/>
+    <pc:docChg chg="undo custSel addSld delSld modSld">
+      <pc:chgData name="Jason Wattier" userId="de6cb9e11468ad32" providerId="LiveId" clId="{ED1BF63C-F5A7-4498-8573-2BF7C6162C2B}" dt="2020-03-27T07:21:18.182" v="3172" actId="20577"/>
       <pc:docMkLst>
         <pc:docMk/>
       </pc:docMkLst>
-      <pc:sldChg chg="modSp add">
-        <pc:chgData name="Jason Wattier" userId="de6cb9e11468ad32" providerId="LiveId" clId="{ED1BF63C-F5A7-4498-8573-2BF7C6162C2B}" dt="2020-03-27T03:01:11.561" v="96" actId="20577"/>
+      <pc:sldChg chg="del">
+        <pc:chgData name="Jason Wattier" userId="de6cb9e11468ad32" providerId="LiveId" clId="{ED1BF63C-F5A7-4498-8573-2BF7C6162C2B}" dt="2020-03-27T07:20:41.634" v="3140" actId="47"/>
+        <pc:sldMkLst>
+          <pc:docMk/>
+          <pc:sldMk cId="3537249684" sldId="257"/>
+        </pc:sldMkLst>
+      </pc:sldChg>
+      <pc:sldChg chg="modSp">
+        <pc:chgData name="Jason Wattier" userId="de6cb9e11468ad32" providerId="LiveId" clId="{ED1BF63C-F5A7-4498-8573-2BF7C6162C2B}" dt="2020-03-27T06:23:11.126" v="705" actId="20577"/>
+        <pc:sldMkLst>
+          <pc:docMk/>
+          <pc:sldMk cId="2177531203" sldId="258"/>
+        </pc:sldMkLst>
+        <pc:spChg chg="mod">
+          <ac:chgData name="Jason Wattier" userId="de6cb9e11468ad32" providerId="LiveId" clId="{ED1BF63C-F5A7-4498-8573-2BF7C6162C2B}" dt="2020-03-27T06:23:11.126" v="705" actId="20577"/>
+          <ac:spMkLst>
+            <pc:docMk/>
+            <pc:sldMk cId="2177531203" sldId="258"/>
+            <ac:spMk id="3" creationId="{A59B4ECB-6CD6-4F95-90AF-9E329B86475B}"/>
+          </ac:spMkLst>
+        </pc:spChg>
+      </pc:sldChg>
+      <pc:sldChg chg="modSp">
+        <pc:chgData name="Jason Wattier" userId="de6cb9e11468ad32" providerId="LiveId" clId="{ED1BF63C-F5A7-4498-8573-2BF7C6162C2B}" dt="2020-03-27T06:24:57.978" v="813" actId="20577"/>
+        <pc:sldMkLst>
+          <pc:docMk/>
+          <pc:sldMk cId="3953112773" sldId="259"/>
+        </pc:sldMkLst>
+        <pc:spChg chg="mod">
+          <ac:chgData name="Jason Wattier" userId="de6cb9e11468ad32" providerId="LiveId" clId="{ED1BF63C-F5A7-4498-8573-2BF7C6162C2B}" dt="2020-03-27T06:24:57.978" v="813" actId="20577"/>
+          <ac:spMkLst>
+            <pc:docMk/>
+            <pc:sldMk cId="3953112773" sldId="259"/>
+            <ac:spMk id="3" creationId="{BC6C7E0E-EAA2-4A05-87FD-F5CB03405315}"/>
+          </ac:spMkLst>
+        </pc:spChg>
+      </pc:sldChg>
+      <pc:sldChg chg="modSp">
+        <pc:chgData name="Jason Wattier" userId="de6cb9e11468ad32" providerId="LiveId" clId="{ED1BF63C-F5A7-4498-8573-2BF7C6162C2B}" dt="2020-03-27T06:26:00.844" v="819" actId="113"/>
+        <pc:sldMkLst>
+          <pc:docMk/>
+          <pc:sldMk cId="1654709154" sldId="260"/>
+        </pc:sldMkLst>
+        <pc:spChg chg="mod">
+          <ac:chgData name="Jason Wattier" userId="de6cb9e11468ad32" providerId="LiveId" clId="{ED1BF63C-F5A7-4498-8573-2BF7C6162C2B}" dt="2020-03-27T06:26:00.844" v="819" actId="113"/>
+          <ac:spMkLst>
+            <pc:docMk/>
+            <pc:sldMk cId="1654709154" sldId="260"/>
+            <ac:spMk id="2" creationId="{1258C140-279E-4E78-A8D5-979E43AC900E}"/>
+          </ac:spMkLst>
+        </pc:spChg>
+        <pc:spChg chg="mod">
+          <ac:chgData name="Jason Wattier" userId="de6cb9e11468ad32" providerId="LiveId" clId="{ED1BF63C-F5A7-4498-8573-2BF7C6162C2B}" dt="2020-03-27T06:25:11.960" v="814" actId="255"/>
+          <ac:spMkLst>
+            <pc:docMk/>
+            <pc:sldMk cId="1654709154" sldId="260"/>
+            <ac:spMk id="3" creationId="{B552D6DE-9928-480A-AA1B-D48CC933E2D9}"/>
+          </ac:spMkLst>
+        </pc:spChg>
+        <pc:spChg chg="mod">
+          <ac:chgData name="Jason Wattier" userId="de6cb9e11468ad32" providerId="LiveId" clId="{ED1BF63C-F5A7-4498-8573-2BF7C6162C2B}" dt="2020-03-27T06:25:27.942" v="816" actId="255"/>
+          <ac:spMkLst>
+            <pc:docMk/>
+            <pc:sldMk cId="1654709154" sldId="260"/>
+            <ac:spMk id="4" creationId="{AA692ACB-37D8-4BA6-BB17-3F96BC023B1E}"/>
+          </ac:spMkLst>
+        </pc:spChg>
+        <pc:spChg chg="mod">
+          <ac:chgData name="Jason Wattier" userId="de6cb9e11468ad32" providerId="LiveId" clId="{ED1BF63C-F5A7-4498-8573-2BF7C6162C2B}" dt="2020-03-27T06:25:19.653" v="815" actId="255"/>
+          <ac:spMkLst>
+            <pc:docMk/>
+            <pc:sldMk cId="1654709154" sldId="260"/>
+            <ac:spMk id="5" creationId="{4029B055-DDCE-4ACA-A381-8159B4D76509}"/>
+          </ac:spMkLst>
+        </pc:spChg>
+        <pc:spChg chg="mod">
+          <ac:chgData name="Jason Wattier" userId="de6cb9e11468ad32" providerId="LiveId" clId="{ED1BF63C-F5A7-4498-8573-2BF7C6162C2B}" dt="2020-03-27T06:25:45.634" v="818" actId="255"/>
+          <ac:spMkLst>
+            <pc:docMk/>
+            <pc:sldMk cId="1654709154" sldId="260"/>
+            <ac:spMk id="6" creationId="{8FF9AD85-BA57-4CCB-885D-2465ECA6A794}"/>
+          </ac:spMkLst>
+        </pc:spChg>
+      </pc:sldChg>
+      <pc:sldChg chg="delSp modSp">
+        <pc:chgData name="Jason Wattier" userId="de6cb9e11468ad32" providerId="LiveId" clId="{ED1BF63C-F5A7-4498-8573-2BF7C6162C2B}" dt="2020-03-27T06:30:39.281" v="1088" actId="20577"/>
+        <pc:sldMkLst>
+          <pc:docMk/>
+          <pc:sldMk cId="669646373" sldId="262"/>
+        </pc:sldMkLst>
+        <pc:spChg chg="mod">
+          <ac:chgData name="Jason Wattier" userId="de6cb9e11468ad32" providerId="LiveId" clId="{ED1BF63C-F5A7-4498-8573-2BF7C6162C2B}" dt="2020-03-27T06:27:10.774" v="845" actId="255"/>
+          <ac:spMkLst>
+            <pc:docMk/>
+            <pc:sldMk cId="669646373" sldId="262"/>
+            <ac:spMk id="2" creationId="{D7CB8EAB-C9FE-476E-A057-9858F7A35A7B}"/>
+          </ac:spMkLst>
+        </pc:spChg>
+        <pc:spChg chg="mod">
+          <ac:chgData name="Jason Wattier" userId="de6cb9e11468ad32" providerId="LiveId" clId="{ED1BF63C-F5A7-4498-8573-2BF7C6162C2B}" dt="2020-03-27T06:30:39.281" v="1088" actId="20577"/>
+          <ac:spMkLst>
+            <pc:docMk/>
+            <pc:sldMk cId="669646373" sldId="262"/>
+            <ac:spMk id="3" creationId="{2F186D55-0609-4F0A-958C-96015A967471}"/>
+          </ac:spMkLst>
+        </pc:spChg>
+        <pc:spChg chg="del">
+          <ac:chgData name="Jason Wattier" userId="de6cb9e11468ad32" providerId="LiveId" clId="{ED1BF63C-F5A7-4498-8573-2BF7C6162C2B}" dt="2020-03-27T06:26:21.116" v="820" actId="478"/>
+          <ac:spMkLst>
+            <pc:docMk/>
+            <pc:sldMk cId="669646373" sldId="262"/>
+            <ac:spMk id="4" creationId="{37E36561-3222-4739-96C4-06B335CCA78B}"/>
+          </ac:spMkLst>
+        </pc:spChg>
+      </pc:sldChg>
+      <pc:sldChg chg="addSp delSp modSp add">
+        <pc:chgData name="Jason Wattier" userId="de6cb9e11468ad32" providerId="LiveId" clId="{ED1BF63C-F5A7-4498-8573-2BF7C6162C2B}" dt="2020-03-27T06:42:27.585" v="1396"/>
         <pc:sldMkLst>
           <pc:docMk/>
           <pc:sldMk cId="299699445" sldId="263"/>
         </pc:sldMkLst>
-        <pc:spChg chg="mod">
-          <ac:chgData name="Jason Wattier" userId="de6cb9e11468ad32" providerId="LiveId" clId="{ED1BF63C-F5A7-4498-8573-2BF7C6162C2B}" dt="2020-03-27T02:56:35.223" v="20" actId="20577"/>
+        <pc:spChg chg="add del mod">
+          <ac:chgData name="Jason Wattier" userId="de6cb9e11468ad32" providerId="LiveId" clId="{ED1BF63C-F5A7-4498-8573-2BF7C6162C2B}" dt="2020-03-27T06:32:32.298" v="1091" actId="113"/>
           <ac:spMkLst>
             <pc:docMk/>
             <pc:sldMk cId="299699445" sldId="263"/>
@@ -148,22 +281,46 @@
           </ac:spMkLst>
         </pc:spChg>
         <pc:spChg chg="mod">
-          <ac:chgData name="Jason Wattier" userId="de6cb9e11468ad32" providerId="LiveId" clId="{ED1BF63C-F5A7-4498-8573-2BF7C6162C2B}" dt="2020-03-27T03:01:11.561" v="96" actId="20577"/>
+          <ac:chgData name="Jason Wattier" userId="de6cb9e11468ad32" providerId="LiveId" clId="{ED1BF63C-F5A7-4498-8573-2BF7C6162C2B}" dt="2020-03-27T06:30:17.073" v="1054" actId="255"/>
           <ac:spMkLst>
             <pc:docMk/>
             <pc:sldMk cId="299699445" sldId="263"/>
             <ac:spMk id="3" creationId="{2F186D55-0609-4F0A-958C-96015A967471}"/>
           </ac:spMkLst>
         </pc:spChg>
+        <pc:spChg chg="del">
+          <ac:chgData name="Jason Wattier" userId="de6cb9e11468ad32" providerId="LiveId" clId="{ED1BF63C-F5A7-4498-8573-2BF7C6162C2B}" dt="2020-03-27T06:27:59.029" v="849" actId="478"/>
+          <ac:spMkLst>
+            <pc:docMk/>
+            <pc:sldMk cId="299699445" sldId="263"/>
+            <ac:spMk id="4" creationId="{37E36561-3222-4739-96C4-06B335CCA78B}"/>
+          </ac:spMkLst>
+        </pc:spChg>
+        <pc:spChg chg="add del mod">
+          <ac:chgData name="Jason Wattier" userId="de6cb9e11468ad32" providerId="LiveId" clId="{ED1BF63C-F5A7-4498-8573-2BF7C6162C2B}" dt="2020-03-27T06:27:55.097" v="848" actId="478"/>
+          <ac:spMkLst>
+            <pc:docMk/>
+            <pc:sldMk cId="299699445" sldId="263"/>
+            <ac:spMk id="6" creationId="{789F9710-E713-4533-A1B0-92B89CB0715B}"/>
+          </ac:spMkLst>
+        </pc:spChg>
+        <pc:spChg chg="add del">
+          <ac:chgData name="Jason Wattier" userId="de6cb9e11468ad32" providerId="LiveId" clId="{ED1BF63C-F5A7-4498-8573-2BF7C6162C2B}" dt="2020-03-27T06:42:27.585" v="1396"/>
+          <ac:spMkLst>
+            <pc:docMk/>
+            <pc:sldMk cId="299699445" sldId="263"/>
+            <ac:spMk id="7" creationId="{0E9C972B-B82F-40DE-815E-61E8C5674D90}"/>
+          </ac:spMkLst>
+        </pc:spChg>
       </pc:sldChg>
-      <pc:sldChg chg="modSp add">
-        <pc:chgData name="Jason Wattier" userId="de6cb9e11468ad32" providerId="LiveId" clId="{ED1BF63C-F5A7-4498-8573-2BF7C6162C2B}" dt="2020-03-27T03:03:00.977" v="264" actId="20577"/>
+      <pc:sldChg chg="delSp modSp add">
+        <pc:chgData name="Jason Wattier" userId="de6cb9e11468ad32" providerId="LiveId" clId="{ED1BF63C-F5A7-4498-8573-2BF7C6162C2B}" dt="2020-03-27T06:37:49.444" v="1394" actId="20577"/>
         <pc:sldMkLst>
           <pc:docMk/>
           <pc:sldMk cId="3074340298" sldId="264"/>
         </pc:sldMkLst>
         <pc:spChg chg="mod">
-          <ac:chgData name="Jason Wattier" userId="de6cb9e11468ad32" providerId="LiveId" clId="{ED1BF63C-F5A7-4498-8573-2BF7C6162C2B}" dt="2020-03-27T03:02:15.345" v="115" actId="20577"/>
+          <ac:chgData name="Jason Wattier" userId="de6cb9e11468ad32" providerId="LiveId" clId="{ED1BF63C-F5A7-4498-8573-2BF7C6162C2B}" dt="2020-03-27T06:34:42.530" v="1223" actId="20577"/>
           <ac:spMkLst>
             <pc:docMk/>
             <pc:sldMk cId="3074340298" sldId="264"/>
@@ -171,22 +328,30 @@
           </ac:spMkLst>
         </pc:spChg>
         <pc:spChg chg="mod">
-          <ac:chgData name="Jason Wattier" userId="de6cb9e11468ad32" providerId="LiveId" clId="{ED1BF63C-F5A7-4498-8573-2BF7C6162C2B}" dt="2020-03-27T03:03:00.977" v="264" actId="20577"/>
+          <ac:chgData name="Jason Wattier" userId="de6cb9e11468ad32" providerId="LiveId" clId="{ED1BF63C-F5A7-4498-8573-2BF7C6162C2B}" dt="2020-03-27T06:37:49.444" v="1394" actId="20577"/>
           <ac:spMkLst>
             <pc:docMk/>
             <pc:sldMk cId="3074340298" sldId="264"/>
             <ac:spMk id="3" creationId="{2F186D55-0609-4F0A-958C-96015A967471}"/>
           </ac:spMkLst>
         </pc:spChg>
+        <pc:spChg chg="del">
+          <ac:chgData name="Jason Wattier" userId="de6cb9e11468ad32" providerId="LiveId" clId="{ED1BF63C-F5A7-4498-8573-2BF7C6162C2B}" dt="2020-03-27T06:30:54.062" v="1089" actId="478"/>
+          <ac:spMkLst>
+            <pc:docMk/>
+            <pc:sldMk cId="3074340298" sldId="264"/>
+            <ac:spMk id="4" creationId="{37E36561-3222-4739-96C4-06B335CCA78B}"/>
+          </ac:spMkLst>
+        </pc:spChg>
       </pc:sldChg>
-      <pc:sldChg chg="modSp add">
-        <pc:chgData name="Jason Wattier" userId="de6cb9e11468ad32" providerId="LiveId" clId="{ED1BF63C-F5A7-4498-8573-2BF7C6162C2B}" dt="2020-03-27T03:09:26.993" v="380" actId="13926"/>
+      <pc:sldChg chg="delSp modSp add addCm modCm">
+        <pc:chgData name="Jason Wattier" userId="de6cb9e11468ad32" providerId="LiveId" clId="{ED1BF63C-F5A7-4498-8573-2BF7C6162C2B}" dt="2020-03-27T07:21:18.182" v="3172" actId="20577"/>
         <pc:sldMkLst>
           <pc:docMk/>
           <pc:sldMk cId="236543114" sldId="265"/>
         </pc:sldMkLst>
         <pc:spChg chg="mod">
-          <ac:chgData name="Jason Wattier" userId="de6cb9e11468ad32" providerId="LiveId" clId="{ED1BF63C-F5A7-4498-8573-2BF7C6162C2B}" dt="2020-03-27T03:03:32.121" v="276" actId="20577"/>
+          <ac:chgData name="Jason Wattier" userId="de6cb9e11468ad32" providerId="LiveId" clId="{ED1BF63C-F5A7-4498-8573-2BF7C6162C2B}" dt="2020-03-27T07:21:11.436" v="3159" actId="113"/>
           <ac:spMkLst>
             <pc:docMk/>
             <pc:sldMk cId="236543114" sldId="265"/>
@@ -194,22 +359,30 @@
           </ac:spMkLst>
         </pc:spChg>
         <pc:spChg chg="mod">
-          <ac:chgData name="Jason Wattier" userId="de6cb9e11468ad32" providerId="LiveId" clId="{ED1BF63C-F5A7-4498-8573-2BF7C6162C2B}" dt="2020-03-27T03:09:26.993" v="380" actId="13926"/>
+          <ac:chgData name="Jason Wattier" userId="de6cb9e11468ad32" providerId="LiveId" clId="{ED1BF63C-F5A7-4498-8573-2BF7C6162C2B}" dt="2020-03-27T07:21:18.182" v="3172" actId="20577"/>
           <ac:spMkLst>
             <pc:docMk/>
             <pc:sldMk cId="236543114" sldId="265"/>
             <ac:spMk id="3" creationId="{2F186D55-0609-4F0A-958C-96015A967471}"/>
           </ac:spMkLst>
         </pc:spChg>
+        <pc:spChg chg="del">
+          <ac:chgData name="Jason Wattier" userId="de6cb9e11468ad32" providerId="LiveId" clId="{ED1BF63C-F5A7-4498-8573-2BF7C6162C2B}" dt="2020-03-27T07:14:19.410" v="2563" actId="478"/>
+          <ac:spMkLst>
+            <pc:docMk/>
+            <pc:sldMk cId="236543114" sldId="265"/>
+            <ac:spMk id="4" creationId="{37E36561-3222-4739-96C4-06B335CCA78B}"/>
+          </ac:spMkLst>
+        </pc:spChg>
       </pc:sldChg>
       <pc:sldChg chg="modSp add">
-        <pc:chgData name="Jason Wattier" userId="de6cb9e11468ad32" providerId="LiveId" clId="{ED1BF63C-F5A7-4498-8573-2BF7C6162C2B}" dt="2020-03-27T03:11:09.998" v="625" actId="20577"/>
+        <pc:chgData name="Jason Wattier" userId="de6cb9e11468ad32" providerId="LiveId" clId="{ED1BF63C-F5A7-4498-8573-2BF7C6162C2B}" dt="2020-03-27T07:20:05.278" v="3138" actId="20577"/>
         <pc:sldMkLst>
           <pc:docMk/>
           <pc:sldMk cId="3165296934" sldId="266"/>
         </pc:sldMkLst>
         <pc:spChg chg="mod">
-          <ac:chgData name="Jason Wattier" userId="de6cb9e11468ad32" providerId="LiveId" clId="{ED1BF63C-F5A7-4498-8573-2BF7C6162C2B}" dt="2020-03-27T03:10:10.076" v="406" actId="20577"/>
+          <ac:chgData name="Jason Wattier" userId="de6cb9e11468ad32" providerId="LiveId" clId="{ED1BF63C-F5A7-4498-8573-2BF7C6162C2B}" dt="2020-03-27T07:15:14.212" v="2571" actId="20577"/>
           <ac:spMkLst>
             <pc:docMk/>
             <pc:sldMk cId="3165296934" sldId="266"/>
@@ -217,11 +390,19 @@
           </ac:spMkLst>
         </pc:spChg>
         <pc:spChg chg="mod">
-          <ac:chgData name="Jason Wattier" userId="de6cb9e11468ad32" providerId="LiveId" clId="{ED1BF63C-F5A7-4498-8573-2BF7C6162C2B}" dt="2020-03-27T03:11:09.998" v="625" actId="20577"/>
+          <ac:chgData name="Jason Wattier" userId="de6cb9e11468ad32" providerId="LiveId" clId="{ED1BF63C-F5A7-4498-8573-2BF7C6162C2B}" dt="2020-03-27T07:20:05.278" v="3138" actId="20577"/>
           <ac:spMkLst>
             <pc:docMk/>
             <pc:sldMk cId="3165296934" sldId="266"/>
             <ac:spMk id="3" creationId="{6A8089F9-F89C-4926-A5C7-6909BD500EFC}"/>
+          </ac:spMkLst>
+        </pc:spChg>
+        <pc:spChg chg="mod">
+          <ac:chgData name="Jason Wattier" userId="de6cb9e11468ad32" providerId="LiveId" clId="{ED1BF63C-F5A7-4498-8573-2BF7C6162C2B}" dt="2020-03-27T07:18:31.175" v="2972" actId="27636"/>
+          <ac:spMkLst>
+            <pc:docMk/>
+            <pc:sldMk cId="3165296934" sldId="266"/>
+            <ac:spMk id="4" creationId="{3BE4A983-806A-4BAE-AB51-51ADCA13F7B4}"/>
           </ac:spMkLst>
         </pc:spChg>
       </pc:sldChg>
@@ -239,9 +420,76 @@
           <pc:sldMk cId="4067404072" sldId="266"/>
         </pc:sldMkLst>
       </pc:sldChg>
+      <pc:sldChg chg="modSp add">
+        <pc:chgData name="Jason Wattier" userId="de6cb9e11468ad32" providerId="LiveId" clId="{ED1BF63C-F5A7-4498-8573-2BF7C6162C2B}" dt="2020-03-27T06:57:36.129" v="2168" actId="20577"/>
+        <pc:sldMkLst>
+          <pc:docMk/>
+          <pc:sldMk cId="1705735900" sldId="267"/>
+        </pc:sldMkLst>
+        <pc:spChg chg="mod">
+          <ac:chgData name="Jason Wattier" userId="de6cb9e11468ad32" providerId="LiveId" clId="{ED1BF63C-F5A7-4498-8573-2BF7C6162C2B}" dt="2020-03-27T06:43:49.070" v="1443" actId="20577"/>
+          <ac:spMkLst>
+            <pc:docMk/>
+            <pc:sldMk cId="1705735900" sldId="267"/>
+            <ac:spMk id="2" creationId="{D7CB8EAB-C9FE-476E-A057-9858F7A35A7B}"/>
+          </ac:spMkLst>
+        </pc:spChg>
+        <pc:spChg chg="mod">
+          <ac:chgData name="Jason Wattier" userId="de6cb9e11468ad32" providerId="LiveId" clId="{ED1BF63C-F5A7-4498-8573-2BF7C6162C2B}" dt="2020-03-27T06:57:36.129" v="2168" actId="20577"/>
+          <ac:spMkLst>
+            <pc:docMk/>
+            <pc:sldMk cId="1705735900" sldId="267"/>
+            <ac:spMk id="3" creationId="{2F186D55-0609-4F0A-958C-96015A967471}"/>
+          </ac:spMkLst>
+        </pc:spChg>
+      </pc:sldChg>
+      <pc:sldChg chg="add del">
+        <pc:chgData name="Jason Wattier" userId="de6cb9e11468ad32" providerId="LiveId" clId="{ED1BF63C-F5A7-4498-8573-2BF7C6162C2B}" dt="2020-03-27T06:42:33.224" v="1398"/>
+        <pc:sldMkLst>
+          <pc:docMk/>
+          <pc:sldMk cId="2487058826" sldId="267"/>
+        </pc:sldMkLst>
+      </pc:sldChg>
+      <pc:sldChg chg="delSp modSp add">
+        <pc:chgData name="Jason Wattier" userId="de6cb9e11468ad32" providerId="LiveId" clId="{ED1BF63C-F5A7-4498-8573-2BF7C6162C2B}" dt="2020-03-27T07:20:53.481" v="3158" actId="478"/>
+        <pc:sldMkLst>
+          <pc:docMk/>
+          <pc:sldMk cId="1670518466" sldId="268"/>
+        </pc:sldMkLst>
+        <pc:spChg chg="mod">
+          <ac:chgData name="Jason Wattier" userId="de6cb9e11468ad32" providerId="LiveId" clId="{ED1BF63C-F5A7-4498-8573-2BF7C6162C2B}" dt="2020-03-27T07:20:48.690" v="3157" actId="20577"/>
+          <ac:spMkLst>
+            <pc:docMk/>
+            <pc:sldMk cId="1670518466" sldId="268"/>
+            <ac:spMk id="2" creationId="{9BF69D86-3E19-4C2E-AF44-2620240ED1DD}"/>
+          </ac:spMkLst>
+        </pc:spChg>
+        <pc:spChg chg="del">
+          <ac:chgData name="Jason Wattier" userId="de6cb9e11468ad32" providerId="LiveId" clId="{ED1BF63C-F5A7-4498-8573-2BF7C6162C2B}" dt="2020-03-27T07:20:53.481" v="3158" actId="478"/>
+          <ac:spMkLst>
+            <pc:docMk/>
+            <pc:sldMk cId="1670518466" sldId="268"/>
+            <ac:spMk id="3" creationId="{1B89B1DC-BA04-4B28-90BD-6FF1DB66E149}"/>
+          </ac:spMkLst>
+        </pc:spChg>
+      </pc:sldChg>
     </pc:docChg>
   </pc:docChgLst>
 </pc:chgInfo>
+</file>
+
+<file path=ppt/comments/comment1.xml><?xml version="1.0" encoding="utf-8"?>
+<p:cmLst xmlns:a="http://schemas.openxmlformats.org/drawingml/2006/main" xmlns:r="http://schemas.openxmlformats.org/officeDocument/2006/relationships" xmlns:p="http://schemas.openxmlformats.org/presentationml/2006/main">
+  <p:cm authorId="1" dt="2020-03-27T02:14:33.425" idx="1">
+    <p:pos x="1581" y="1880"/>
+    <p:text>try to have diagram of inputs, process and outputs</p:text>
+    <p:extLst>
+      <p:ext uri="{C676402C-5697-4E1C-873F-D02D1690AC5C}">
+        <p15:threadingInfo xmlns:p15="http://schemas.microsoft.com/office/powerpoint/2012/main" timeZoneBias="300"/>
+      </p:ext>
+    </p:extLst>
+  </p:cm>
+</p:cmLst>
 </file>
 
 <file path=ppt/slideLayouts/slideLayout1.xml><?xml version="1.0" encoding="utf-8"?>
@@ -469,7 +717,7 @@
             <a:fld id="{5586B75A-687E-405C-8A0B-8D00578BA2C3}" type="datetimeFigureOut">
               <a:rPr lang="en-US" dirty="0"/>
               <a:pPr/>
-              <a:t>3/26/2020</a:t>
+              <a:t>3/27/2020</a:t>
             </a:fld>
             <a:endParaRPr lang="en-US" dirty="0"/>
           </a:p>
@@ -636,7 +884,7 @@
             <a:fld id="{5586B75A-687E-405C-8A0B-8D00578BA2C3}" type="datetimeFigureOut">
               <a:rPr lang="en-US" dirty="0"/>
               <a:pPr/>
-              <a:t>3/26/2020</a:t>
+              <a:t>3/27/2020</a:t>
             </a:fld>
             <a:endParaRPr lang="en-US" dirty="0"/>
           </a:p>
@@ -813,7 +1061,7 @@
             <a:fld id="{5586B75A-687E-405C-8A0B-8D00578BA2C3}" type="datetimeFigureOut">
               <a:rPr lang="en-US" dirty="0"/>
               <a:pPr/>
-              <a:t>3/26/2020</a:t>
+              <a:t>3/27/2020</a:t>
             </a:fld>
             <a:endParaRPr lang="en-US" dirty="0"/>
           </a:p>
@@ -980,7 +1228,7 @@
             <a:fld id="{5586B75A-687E-405C-8A0B-8D00578BA2C3}" type="datetimeFigureOut">
               <a:rPr lang="en-US" dirty="0"/>
               <a:pPr/>
-              <a:t>3/26/2020</a:t>
+              <a:t>3/27/2020</a:t>
             </a:fld>
             <a:endParaRPr lang="en-US" dirty="0"/>
           </a:p>
@@ -1235,7 +1483,7 @@
             <a:fld id="{5586B75A-687E-405C-8A0B-8D00578BA2C3}" type="datetimeFigureOut">
               <a:rPr lang="en-US" dirty="0"/>
               <a:pPr/>
-              <a:t>3/26/2020</a:t>
+              <a:t>3/27/2020</a:t>
             </a:fld>
             <a:endParaRPr lang="en-US" dirty="0"/>
           </a:p>
@@ -1520,7 +1768,7 @@
             <a:fld id="{5586B75A-687E-405C-8A0B-8D00578BA2C3}" type="datetimeFigureOut">
               <a:rPr lang="en-US" dirty="0"/>
               <a:pPr/>
-              <a:t>3/26/2020</a:t>
+              <a:t>3/27/2020</a:t>
             </a:fld>
             <a:endParaRPr lang="en-US" dirty="0"/>
           </a:p>
@@ -1959,7 +2207,7 @@
             <a:fld id="{5586B75A-687E-405C-8A0B-8D00578BA2C3}" type="datetimeFigureOut">
               <a:rPr lang="en-US" dirty="0"/>
               <a:pPr/>
-              <a:t>3/26/2020</a:t>
+              <a:t>3/27/2020</a:t>
             </a:fld>
             <a:endParaRPr lang="en-US" dirty="0"/>
           </a:p>
@@ -2074,7 +2322,7 @@
             <a:fld id="{5586B75A-687E-405C-8A0B-8D00578BA2C3}" type="datetimeFigureOut">
               <a:rPr lang="en-US" dirty="0"/>
               <a:pPr/>
-              <a:t>3/26/2020</a:t>
+              <a:t>3/27/2020</a:t>
             </a:fld>
             <a:endParaRPr lang="en-US" dirty="0"/>
           </a:p>
@@ -2166,7 +2414,7 @@
             <a:fld id="{5586B75A-687E-405C-8A0B-8D00578BA2C3}" type="datetimeFigureOut">
               <a:rPr lang="en-US" dirty="0"/>
               <a:pPr/>
-              <a:t>3/26/2020</a:t>
+              <a:t>3/27/2020</a:t>
             </a:fld>
             <a:endParaRPr lang="en-US" dirty="0"/>
           </a:p>
@@ -2451,7 +2699,7 @@
             <a:fld id="{5586B75A-687E-405C-8A0B-8D00578BA2C3}" type="datetimeFigureOut">
               <a:rPr lang="en-US" dirty="0"/>
               <a:pPr/>
-              <a:t>3/26/2020</a:t>
+              <a:t>3/27/2020</a:t>
             </a:fld>
             <a:endParaRPr lang="en-US" dirty="0"/>
           </a:p>
@@ -2721,7 +2969,7 @@
             <a:fld id="{5586B75A-687E-405C-8A0B-8D00578BA2C3}" type="datetimeFigureOut">
               <a:rPr lang="en-US" dirty="0"/>
               <a:pPr/>
-              <a:t>3/26/2020</a:t>
+              <a:t>3/27/2020</a:t>
             </a:fld>
             <a:endParaRPr lang="en-US" dirty="0"/>
           </a:p>
@@ -3015,7 +3263,7 @@
             <a:fld id="{5586B75A-687E-405C-8A0B-8D00578BA2C3}" type="datetimeFigureOut">
               <a:rPr lang="en-US" dirty="0"/>
               <a:pPr/>
-              <a:t>3/26/2020</a:t>
+              <a:t>3/27/2020</a:t>
             </a:fld>
             <a:endParaRPr lang="en-US" dirty="0"/>
           </a:p>
@@ -3585,7 +3833,7 @@
           <p:cNvPr id="2" name="Title 1">
             <a:extLst>
               <a:ext uri="{FF2B5EF4-FFF2-40B4-BE49-F238E27FC236}">
-                <a16:creationId xmlns:a16="http://schemas.microsoft.com/office/drawing/2014/main" id="{8CB0BA77-845C-4965-B44A-EBD98A20C42D}"/>
+                <a16:creationId xmlns:a16="http://schemas.microsoft.com/office/drawing/2014/main" id="{99D19D63-76FE-4AA3-9EB7-9F289AAC671C}"/>
               </a:ext>
             </a:extLst>
           </p:cNvPr>
@@ -3601,16 +3849,19 @@
           <a:bodyPr/>
           <a:lstStyle/>
           <a:p>
-            <a:endParaRPr lang="en-US"/>
-          </a:p>
-        </p:txBody>
-      </p:sp>
-      <p:sp>
-        <p:nvSpPr>
-          <p:cNvPr id="3" name="Text Placeholder 2">
+            <a:r>
+              <a:rPr lang="en-US" b="1" dirty="0"/>
+              <a:t>Future Ideas</a:t>
+            </a:r>
+          </a:p>
+        </p:txBody>
+      </p:sp>
+      <p:sp>
+        <p:nvSpPr>
+          <p:cNvPr id="3" name="Content Placeholder 2">
             <a:extLst>
               <a:ext uri="{FF2B5EF4-FFF2-40B4-BE49-F238E27FC236}">
-                <a16:creationId xmlns:a16="http://schemas.microsoft.com/office/drawing/2014/main" id="{AA6F6D22-EBDD-4107-A900-3F0FA13776FA}"/>
+                <a16:creationId xmlns:a16="http://schemas.microsoft.com/office/drawing/2014/main" id="{6A8089F9-F89C-4926-A5C7-6909BD500EFC}"/>
               </a:ext>
             </a:extLst>
           </p:cNvPr>
@@ -3618,22 +3869,154 @@
             <a:spLocks noGrp="1"/>
           </p:cNvSpPr>
           <p:nvPr>
-            <p:ph type="body" idx="1"/>
-          </p:nvPr>
-        </p:nvSpPr>
-        <p:spPr/>
-        <p:txBody>
-          <a:bodyPr/>
-          <a:lstStyle/>
-          <a:p>
-            <a:endParaRPr lang="en-US"/>
+            <p:ph sz="half" idx="1"/>
+          </p:nvPr>
+        </p:nvSpPr>
+        <p:spPr/>
+        <p:txBody>
+          <a:bodyPr>
+            <a:normAutofit/>
+          </a:bodyPr>
+          <a:lstStyle/>
+          <a:p>
+            <a:r>
+              <a:rPr lang="en-US" dirty="0"/>
+              <a:t>Three primary areas:</a:t>
+            </a:r>
+          </a:p>
+          <a:p>
+            <a:pPr lvl="1"/>
+            <a:r>
+              <a:rPr lang="en-US" dirty="0"/>
+              <a:t>Level of analysis – allow for Census Block or Census Tract</a:t>
+            </a:r>
+          </a:p>
+          <a:p>
+            <a:pPr lvl="1"/>
+            <a:r>
+              <a:rPr lang="en-US" dirty="0"/>
+              <a:t>Flexibility in metric calculation: </a:t>
+            </a:r>
+          </a:p>
+          <a:p>
+            <a:pPr lvl="2"/>
+            <a:r>
+              <a:rPr lang="en-US" dirty="0"/>
+              <a:t>Different metrics for different resources</a:t>
+            </a:r>
+          </a:p>
+          <a:p>
+            <a:pPr lvl="2"/>
+            <a:r>
+              <a:rPr lang="en-US" dirty="0"/>
+              <a:t>Different weighting of travel time per asset category</a:t>
+            </a:r>
+          </a:p>
+          <a:p>
+            <a:pPr lvl="2"/>
+            <a:r>
+              <a:rPr lang="en-US" dirty="0"/>
+              <a:t>Composite Score </a:t>
+            </a:r>
+          </a:p>
+          <a:p>
+            <a:pPr lvl="1"/>
+            <a:r>
+              <a:rPr lang="en-US" dirty="0"/>
+              <a:t>Support more analysis and information discovery within the application </a:t>
+            </a:r>
+          </a:p>
+        </p:txBody>
+      </p:sp>
+      <p:sp>
+        <p:nvSpPr>
+          <p:cNvPr id="4" name="Content Placeholder 3">
+            <a:extLst>
+              <a:ext uri="{FF2B5EF4-FFF2-40B4-BE49-F238E27FC236}">
+                <a16:creationId xmlns:a16="http://schemas.microsoft.com/office/drawing/2014/main" id="{3BE4A983-806A-4BAE-AB51-51ADCA13F7B4}"/>
+              </a:ext>
+            </a:extLst>
+          </p:cNvPr>
+          <p:cNvSpPr>
+            <a:spLocks noGrp="1"/>
+          </p:cNvSpPr>
+          <p:nvPr>
+            <p:ph sz="half" idx="2"/>
+          </p:nvPr>
+        </p:nvSpPr>
+        <p:spPr/>
+        <p:txBody>
+          <a:bodyPr>
+            <a:normAutofit/>
+          </a:bodyPr>
+          <a:lstStyle/>
+          <a:p>
+            <a:endParaRPr lang="en-US" dirty="0"/>
           </a:p>
         </p:txBody>
       </p:sp>
     </p:spTree>
     <p:extLst>
       <p:ext uri="{BB962C8B-B14F-4D97-AF65-F5344CB8AC3E}">
-        <p14:creationId xmlns:p14="http://schemas.microsoft.com/office/powerpoint/2010/main" val="3537249684"/>
+        <p14:creationId xmlns:p14="http://schemas.microsoft.com/office/powerpoint/2010/main" val="3165296934"/>
+      </p:ext>
+    </p:extLst>
+  </p:cSld>
+  <p:clrMapOvr>
+    <a:masterClrMapping/>
+  </p:clrMapOvr>
+</p:sld>
+</file>
+
+<file path=ppt/slides/slide11.xml><?xml version="1.0" encoding="utf-8"?>
+<p:sld xmlns:a="http://schemas.openxmlformats.org/drawingml/2006/main" xmlns:r="http://schemas.openxmlformats.org/officeDocument/2006/relationships" xmlns:p="http://schemas.openxmlformats.org/presentationml/2006/main">
+  <p:cSld>
+    <p:spTree>
+      <p:nvGrpSpPr>
+        <p:cNvPr id="1" name=""/>
+        <p:cNvGrpSpPr/>
+        <p:nvPr/>
+      </p:nvGrpSpPr>
+      <p:grpSpPr>
+        <a:xfrm>
+          <a:off x="0" y="0"/>
+          <a:ext cx="0" cy="0"/>
+          <a:chOff x="0" y="0"/>
+          <a:chExt cx="0" cy="0"/>
+        </a:xfrm>
+      </p:grpSpPr>
+      <p:sp>
+        <p:nvSpPr>
+          <p:cNvPr id="2" name="Title 1">
+            <a:extLst>
+              <a:ext uri="{FF2B5EF4-FFF2-40B4-BE49-F238E27FC236}">
+                <a16:creationId xmlns:a16="http://schemas.microsoft.com/office/drawing/2014/main" id="{9BF69D86-3E19-4C2E-AF44-2620240ED1DD}"/>
+              </a:ext>
+            </a:extLst>
+          </p:cNvPr>
+          <p:cNvSpPr>
+            <a:spLocks noGrp="1"/>
+          </p:cNvSpPr>
+          <p:nvPr>
+            <p:ph type="ctrTitle"/>
+          </p:nvPr>
+        </p:nvSpPr>
+        <p:spPr/>
+        <p:txBody>
+          <a:bodyPr/>
+          <a:lstStyle/>
+          <a:p>
+            <a:r>
+              <a:rPr lang="en-US" dirty="0"/>
+              <a:t>Thank you</a:t>
+            </a:r>
+          </a:p>
+        </p:txBody>
+      </p:sp>
+    </p:spTree>
+    <p:extLst>
+      <p:ext uri="{BB962C8B-B14F-4D97-AF65-F5344CB8AC3E}">
+        <p14:creationId xmlns:p14="http://schemas.microsoft.com/office/powerpoint/2010/main" val="1670518466"/>
       </p:ext>
     </p:extLst>
   </p:cSld>
@@ -3719,13 +4102,7 @@
           <a:p>
             <a:r>
               <a:rPr lang="en-US" sz="3200" dirty="0"/>
-              <a:t>Background</a:t>
-            </a:r>
-          </a:p>
-          <a:p>
-            <a:r>
-              <a:rPr lang="en-US" sz="3200" dirty="0"/>
-              <a:t>Process</a:t>
+              <a:t>Background / Process</a:t>
             </a:r>
           </a:p>
           <a:p>
@@ -3746,13 +4123,27 @@
             <a:pPr lvl="1"/>
             <a:r>
               <a:rPr lang="en-US" sz="2400" dirty="0"/>
-              <a:t>Other Stuff</a:t>
+              <a:t>Other Considerations</a:t>
             </a:r>
           </a:p>
           <a:p>
             <a:r>
               <a:rPr lang="en-US" sz="3200" dirty="0"/>
               <a:t>Application</a:t>
+            </a:r>
+          </a:p>
+          <a:p>
+            <a:pPr lvl="1"/>
+            <a:r>
+              <a:rPr lang="en-US" sz="3000" dirty="0"/>
+              <a:t>Current Setup</a:t>
+            </a:r>
+          </a:p>
+          <a:p>
+            <a:pPr lvl="1"/>
+            <a:r>
+              <a:rPr lang="en-US" sz="3000" dirty="0"/>
+              <a:t>Future Ideas</a:t>
             </a:r>
           </a:p>
           <a:p>
@@ -3839,12 +4230,26 @@
         </p:nvSpPr>
         <p:spPr/>
         <p:txBody>
-          <a:bodyPr/>
-          <a:lstStyle/>
-          <a:p>
-            <a:r>
-              <a:rPr lang="en-US" dirty="0"/>
+          <a:bodyPr>
+            <a:normAutofit/>
+          </a:bodyPr>
+          <a:lstStyle/>
+          <a:p>
+            <a:r>
+              <a:rPr lang="en-US" sz="2800" dirty="0"/>
               <a:t>To create a framework that streamlines accessibility analysis for the NYC metro area utilizing open source technologies.</a:t>
+            </a:r>
+          </a:p>
+          <a:p>
+            <a:pPr marL="0" indent="0">
+              <a:buNone/>
+            </a:pPr>
+            <a:endParaRPr lang="en-US" sz="2800" dirty="0"/>
+          </a:p>
+          <a:p>
+            <a:r>
+              <a:rPr lang="en-US" sz="2800" dirty="0"/>
+              <a:t>Goal – Making  Analysis and Research Easier and More Timely</a:t>
             </a:r>
           </a:p>
         </p:txBody>
@@ -3901,7 +4306,7 @@
           <a:lstStyle/>
           <a:p>
             <a:r>
-              <a:rPr lang="en-US" dirty="0"/>
+              <a:rPr lang="en-US" b="1" dirty="0"/>
               <a:t>Open Source vs. Proprietary Software</a:t>
             </a:r>
           </a:p>
@@ -3925,11 +4330,13 @@
         </p:nvSpPr>
         <p:spPr/>
         <p:txBody>
-          <a:bodyPr/>
-          <a:lstStyle/>
-          <a:p>
-            <a:r>
-              <a:rPr lang="en-US" dirty="0"/>
+          <a:bodyPr>
+            <a:normAutofit/>
+          </a:bodyPr>
+          <a:lstStyle/>
+          <a:p>
+            <a:r>
+              <a:rPr lang="en-US" sz="3600" dirty="0"/>
               <a:t>Benefits	</a:t>
             </a:r>
           </a:p>
@@ -3953,23 +4360,25 @@
         </p:nvSpPr>
         <p:spPr/>
         <p:txBody>
-          <a:bodyPr/>
-          <a:lstStyle/>
-          <a:p>
-            <a:r>
-              <a:rPr lang="en-US" dirty="0"/>
+          <a:bodyPr>
+            <a:normAutofit/>
+          </a:bodyPr>
+          <a:lstStyle/>
+          <a:p>
+            <a:r>
+              <a:rPr lang="en-US" sz="2800" dirty="0"/>
               <a:t>Lower financial cost</a:t>
             </a:r>
           </a:p>
           <a:p>
             <a:r>
-              <a:rPr lang="en-US" dirty="0"/>
+              <a:rPr lang="en-US" sz="2800" dirty="0"/>
               <a:t>More collaborators in academic and professional space</a:t>
             </a:r>
           </a:p>
           <a:p>
             <a:r>
-              <a:rPr lang="en-US" dirty="0"/>
+              <a:rPr lang="en-US" sz="2800" dirty="0"/>
               <a:t>Ability to “own the tool” and customize the implementation </a:t>
             </a:r>
           </a:p>
@@ -3993,11 +4402,13 @@
         </p:nvSpPr>
         <p:spPr/>
         <p:txBody>
-          <a:bodyPr/>
-          <a:lstStyle/>
-          <a:p>
-            <a:r>
-              <a:rPr lang="en-US" dirty="0"/>
+          <a:bodyPr>
+            <a:normAutofit/>
+          </a:bodyPr>
+          <a:lstStyle/>
+          <a:p>
+            <a:r>
+              <a:rPr lang="en-US" sz="3600" dirty="0"/>
               <a:t>Costs</a:t>
             </a:r>
           </a:p>
@@ -4021,17 +4432,19 @@
         </p:nvSpPr>
         <p:spPr/>
         <p:txBody>
-          <a:bodyPr/>
-          <a:lstStyle/>
-          <a:p>
-            <a:r>
-              <a:rPr lang="en-US" dirty="0"/>
+          <a:bodyPr>
+            <a:noAutofit/>
+          </a:bodyPr>
+          <a:lstStyle/>
+          <a:p>
+            <a:r>
+              <a:rPr lang="en-US" sz="2800" dirty="0"/>
               <a:t>More upfront investment of time to create and maintain framework</a:t>
             </a:r>
           </a:p>
           <a:p>
             <a:r>
-              <a:rPr lang="en-US" dirty="0"/>
+              <a:rPr lang="en-US" sz="2800" dirty="0"/>
               <a:t>Lack of access to proprietary tools or private data sources</a:t>
             </a:r>
           </a:p>
@@ -4085,12 +4498,14 @@
         </p:nvSpPr>
         <p:spPr/>
         <p:txBody>
-          <a:bodyPr/>
-          <a:lstStyle/>
-          <a:p>
-            <a:r>
-              <a:rPr lang="en-US" dirty="0"/>
-              <a:t>Which Open Source Tool to Pick?</a:t>
+          <a:bodyPr>
+            <a:normAutofit/>
+          </a:bodyPr>
+          <a:lstStyle/>
+          <a:p>
+            <a:r>
+              <a:rPr lang="en-US" sz="3600" b="1" dirty="0"/>
+              <a:t>Which Tool to Use?</a:t>
             </a:r>
           </a:p>
         </p:txBody>
@@ -4117,65 +4532,58 @@
           <a:lstStyle/>
           <a:p>
             <a:r>
-              <a:rPr lang="en-US" dirty="0"/>
+              <a:rPr lang="en-US" sz="2400" dirty="0"/>
               <a:t>Both Python and R are robust tools for analysis with a rich ecosystem of community and extensions for geospatial work. </a:t>
             </a:r>
           </a:p>
           <a:p>
-            <a:r>
-              <a:rPr lang="en-US" dirty="0"/>
+            <a:pPr marL="0" indent="0">
+              <a:buNone/>
+            </a:pPr>
+            <a:endParaRPr lang="en-US" sz="2400" dirty="0"/>
+          </a:p>
+          <a:p>
+            <a:r>
+              <a:rPr lang="en-US" sz="2400" dirty="0"/>
               <a:t>R is generally better suited for research-oriented considerations for the following reasons:</a:t>
             </a:r>
           </a:p>
           <a:p>
             <a:pPr lvl="1"/>
             <a:r>
-              <a:rPr lang="en-US" sz="2000" dirty="0"/>
+              <a:rPr lang="en-US" sz="2400" dirty="0"/>
               <a:t>Direct interface with pertinent information sources (e.g., demographic information from Census Bureau, </a:t>
             </a:r>
             <a:r>
-              <a:rPr lang="en-US" sz="2000" dirty="0" err="1"/>
+              <a:rPr lang="en-US" sz="2400" dirty="0" err="1"/>
               <a:t>OpenTripPlanner</a:t>
             </a:r>
             <a:r>
-              <a:rPr lang="en-US" sz="2000" dirty="0"/>
+              <a:rPr lang="en-US" sz="2400" dirty="0"/>
               <a:t> travel time calculations)</a:t>
             </a:r>
           </a:p>
           <a:p>
             <a:pPr lvl="1"/>
             <a:r>
-              <a:rPr lang="en-US" sz="2000" dirty="0"/>
+              <a:rPr lang="en-US" sz="2400" dirty="0"/>
               <a:t>Extensions that enable document creation or reporting dashboard without needing to learn other programming tools.</a:t>
             </a:r>
           </a:p>
           <a:p>
-            <a:endParaRPr lang="en-US" dirty="0"/>
-          </a:p>
-        </p:txBody>
-      </p:sp>
-      <p:sp>
-        <p:nvSpPr>
-          <p:cNvPr id="4" name="Text Placeholder 3">
-            <a:extLst>
-              <a:ext uri="{FF2B5EF4-FFF2-40B4-BE49-F238E27FC236}">
-                <a16:creationId xmlns:a16="http://schemas.microsoft.com/office/drawing/2014/main" id="{37E36561-3222-4739-96C4-06B335CCA78B}"/>
-              </a:ext>
-            </a:extLst>
-          </p:cNvPr>
-          <p:cNvSpPr>
-            <a:spLocks noGrp="1"/>
-          </p:cNvSpPr>
-          <p:nvPr>
-            <p:ph type="body" sz="half" idx="2"/>
-          </p:nvPr>
-        </p:nvSpPr>
-        <p:spPr/>
-        <p:txBody>
-          <a:bodyPr/>
-          <a:lstStyle/>
-          <a:p>
-            <a:endParaRPr lang="en-US"/>
+            <a:pPr lvl="1"/>
+            <a:r>
+              <a:rPr lang="en-US" sz="2400" b="1" i="1" dirty="0"/>
+              <a:t>Potentially mention </a:t>
+            </a:r>
+            <a:r>
+              <a:rPr lang="en-US" sz="2400" b="1" i="1" dirty="0" err="1"/>
+              <a:t>Rmarkdown</a:t>
+            </a:r>
+            <a:endParaRPr lang="en-US" sz="2400" b="1" i="1" dirty="0"/>
+          </a:p>
+          <a:p>
+            <a:endParaRPr lang="en-US" dirty="0"/>
           </a:p>
         </p:txBody>
       </p:sp>
@@ -4227,11 +4635,13 @@
         </p:nvSpPr>
         <p:spPr/>
         <p:txBody>
-          <a:bodyPr/>
-          <a:lstStyle/>
-          <a:p>
-            <a:r>
-              <a:rPr lang="en-US" dirty="0"/>
+          <a:bodyPr>
+            <a:normAutofit/>
+          </a:bodyPr>
+          <a:lstStyle/>
+          <a:p>
+            <a:r>
+              <a:rPr lang="en-US" sz="3600" b="1" dirty="0"/>
               <a:t>What’s in a Metric?</a:t>
             </a:r>
           </a:p>
@@ -4258,59 +4668,56 @@
           <a:bodyPr/>
           <a:lstStyle/>
           <a:p>
-            <a:r>
-              <a:rPr lang="en-US" dirty="0"/>
-              <a:t>Two main ingredients:</a:t>
+            <a:endParaRPr lang="en-US" dirty="0"/>
+          </a:p>
+          <a:p>
+            <a:r>
+              <a:rPr lang="en-US" sz="2800" dirty="0"/>
+              <a:t>Metric =&gt; A single number meant to objectively reflect a multitude of considerations about a given reality.</a:t>
+            </a:r>
+          </a:p>
+          <a:p>
+            <a:pPr marL="0" indent="0">
+              <a:buNone/>
+            </a:pPr>
+            <a:endParaRPr lang="en-US" sz="2800" dirty="0"/>
+          </a:p>
+          <a:p>
+            <a:r>
+              <a:rPr lang="en-US" sz="2800" dirty="0"/>
+              <a:t>Accessibility metrics:</a:t>
             </a:r>
           </a:p>
           <a:p>
             <a:pPr lvl="1"/>
             <a:r>
-              <a:rPr lang="en-US" dirty="0"/>
+              <a:rPr lang="en-US" sz="2800" dirty="0"/>
+              <a:t>Two main inputs:</a:t>
+            </a:r>
+          </a:p>
+          <a:p>
+            <a:pPr lvl="2"/>
+            <a:r>
+              <a:rPr lang="en-US" sz="2800" dirty="0"/>
               <a:t>Distance</a:t>
             </a:r>
           </a:p>
           <a:p>
-            <a:pPr lvl="1"/>
-            <a:r>
-              <a:rPr lang="en-US" dirty="0"/>
+            <a:pPr lvl="2"/>
+            <a:r>
+              <a:rPr lang="en-US" sz="2800" dirty="0"/>
               <a:t>Number of Resources</a:t>
             </a:r>
           </a:p>
           <a:p>
-            <a:pPr lvl="1"/>
-            <a:r>
-              <a:rPr lang="en-US" i="1" dirty="0"/>
+            <a:pPr lvl="2"/>
+            <a:r>
+              <a:rPr lang="en-US" sz="2800" i="1" dirty="0"/>
               <a:t>Population*</a:t>
             </a:r>
           </a:p>
           <a:p>
             <a:endParaRPr lang="en-US" dirty="0"/>
-          </a:p>
-        </p:txBody>
-      </p:sp>
-      <p:sp>
-        <p:nvSpPr>
-          <p:cNvPr id="4" name="Text Placeholder 3">
-            <a:extLst>
-              <a:ext uri="{FF2B5EF4-FFF2-40B4-BE49-F238E27FC236}">
-                <a16:creationId xmlns:a16="http://schemas.microsoft.com/office/drawing/2014/main" id="{37E36561-3222-4739-96C4-06B335CCA78B}"/>
-              </a:ext>
-            </a:extLst>
-          </p:cNvPr>
-          <p:cNvSpPr>
-            <a:spLocks noGrp="1"/>
-          </p:cNvSpPr>
-          <p:nvPr>
-            <p:ph type="body" sz="half" idx="2"/>
-          </p:nvPr>
-        </p:nvSpPr>
-        <p:spPr/>
-        <p:txBody>
-          <a:bodyPr/>
-          <a:lstStyle/>
-          <a:p>
-            <a:endParaRPr lang="en-US"/>
           </a:p>
         </p:txBody>
       </p:sp>
@@ -4362,12 +4769,14 @@
         </p:nvSpPr>
         <p:spPr/>
         <p:txBody>
-          <a:bodyPr/>
-          <a:lstStyle/>
-          <a:p>
-            <a:r>
-              <a:rPr lang="en-US" dirty="0"/>
-              <a:t>Going the Distance</a:t>
+          <a:bodyPr>
+            <a:normAutofit/>
+          </a:bodyPr>
+          <a:lstStyle/>
+          <a:p>
+            <a:r>
+              <a:rPr lang="en-US" sz="3600" b="1" dirty="0"/>
+              <a:t>Weighted Access Index </a:t>
             </a:r>
           </a:p>
         </p:txBody>
@@ -4390,67 +4799,61 @@
         </p:nvSpPr>
         <p:spPr/>
         <p:txBody>
-          <a:bodyPr/>
-          <a:lstStyle/>
-          <a:p>
-            <a:r>
-              <a:rPr lang="en-US" dirty="0"/>
-              <a:t>Measuring Travel Time distance </a:t>
+          <a:bodyPr>
+            <a:normAutofit/>
+          </a:bodyPr>
+          <a:lstStyle/>
+          <a:p>
+            <a:endParaRPr lang="en-US" dirty="0"/>
+          </a:p>
+          <a:p>
+            <a:r>
+              <a:rPr lang="en-US" sz="2400" dirty="0"/>
+              <a:t>Sum of Number of Resources / Travel Time</a:t>
+            </a:r>
+          </a:p>
+          <a:p>
+            <a:r>
+              <a:rPr lang="en-US" sz="2400" dirty="0"/>
+              <a:t>Example:</a:t>
             </a:r>
           </a:p>
           <a:p>
             <a:pPr lvl="1"/>
             <a:r>
-              <a:rPr lang="en-US" i="1" dirty="0"/>
-              <a:t>Trade-offs with </a:t>
-            </a:r>
-            <a:r>
-              <a:rPr lang="en-US" i="1" dirty="0" err="1"/>
-              <a:t>OpenTripPlanner</a:t>
-            </a:r>
-            <a:endParaRPr lang="en-US" i="1" dirty="0"/>
+              <a:rPr lang="en-US" sz="2400" dirty="0"/>
+              <a:t>A Census Tract has 1 hospital in its “home” census area, 2 hospitals that are in another Census Tract that is 20 minutes away and 10 that are in a Census Tract that is an hour away.</a:t>
+            </a:r>
           </a:p>
           <a:p>
             <a:pPr lvl="1"/>
             <a:r>
-              <a:rPr lang="en-US" i="1" dirty="0"/>
-              <a:t>Utilization of Pre-computed amounts from University of Chicago</a:t>
-            </a:r>
-          </a:p>
-          <a:p>
-            <a:endParaRPr lang="en-US" dirty="0"/>
-          </a:p>
-        </p:txBody>
-      </p:sp>
-      <p:sp>
-        <p:nvSpPr>
-          <p:cNvPr id="4" name="Text Placeholder 3">
-            <a:extLst>
-              <a:ext uri="{FF2B5EF4-FFF2-40B4-BE49-F238E27FC236}">
-                <a16:creationId xmlns:a16="http://schemas.microsoft.com/office/drawing/2014/main" id="{37E36561-3222-4739-96C4-06B335CCA78B}"/>
-              </a:ext>
-            </a:extLst>
-          </p:cNvPr>
-          <p:cNvSpPr>
-            <a:spLocks noGrp="1"/>
-          </p:cNvSpPr>
-          <p:nvPr>
-            <p:ph type="body" sz="half" idx="2"/>
-          </p:nvPr>
-        </p:nvSpPr>
-        <p:spPr/>
-        <p:txBody>
-          <a:bodyPr/>
-          <a:lstStyle/>
-          <a:p>
-            <a:endParaRPr lang="en-US"/>
+              <a:rPr lang="en-US" sz="2400" dirty="0"/>
+              <a:t>Weighted Access Index for hospitals in this Census Tract would be:</a:t>
+            </a:r>
+          </a:p>
+          <a:p>
+            <a:pPr lvl="2"/>
+            <a:r>
+              <a:rPr lang="en-US" sz="2400" dirty="0"/>
+              <a:t>1 hospital / 1 minute (nominal travel time) + 2 / 20 minutes + 10 / 60 minutes =&gt; 1 + 0.10 + 0.16 = 1.16. </a:t>
+            </a:r>
+          </a:p>
+          <a:p>
+            <a:pPr marL="0" indent="0">
+              <a:buNone/>
+            </a:pPr>
+            <a:r>
+              <a:rPr lang="en-US" sz="2800" dirty="0"/>
+              <a:t> </a:t>
+            </a:r>
           </a:p>
         </p:txBody>
       </p:sp>
     </p:spTree>
     <p:extLst>
       <p:ext uri="{BB962C8B-B14F-4D97-AF65-F5344CB8AC3E}">
-        <p14:creationId xmlns:p14="http://schemas.microsoft.com/office/powerpoint/2010/main" val="3074340298"/>
+        <p14:creationId xmlns:p14="http://schemas.microsoft.com/office/powerpoint/2010/main" val="1705735900"/>
       </p:ext>
     </p:extLst>
   </p:cSld>
@@ -4495,13 +4898,20 @@
         </p:nvSpPr>
         <p:spPr/>
         <p:txBody>
-          <a:bodyPr/>
-          <a:lstStyle/>
-          <a:p>
-            <a:r>
-              <a:rPr lang="en-US" dirty="0"/>
-              <a:t>Application</a:t>
-            </a:r>
+          <a:bodyPr>
+            <a:normAutofit/>
+          </a:bodyPr>
+          <a:lstStyle/>
+          <a:p>
+            <a:r>
+              <a:rPr lang="en-US" sz="3600" b="1" dirty="0"/>
+              <a:t>Going the Distance </a:t>
+            </a:r>
+            <a:r>
+              <a:rPr lang="en-US" sz="3600" dirty="0"/>
+              <a:t>– Measuring Travel Time</a:t>
+            </a:r>
+            <a:endParaRPr lang="en-US" sz="3600" b="1" dirty="0"/>
           </a:p>
         </p:txBody>
       </p:sp>
@@ -4527,64 +4937,75 @@
           <a:lstStyle/>
           <a:p>
             <a:r>
-              <a:rPr lang="en-US" dirty="0"/>
-              <a:t>Allow uploading of new community assets listings</a:t>
-            </a:r>
-          </a:p>
-          <a:p>
-            <a:r>
-              <a:rPr lang="en-US" dirty="0">
-                <a:highlight>
-                  <a:srgbClr val="FFFF00"/>
-                </a:highlight>
-              </a:rPr>
-              <a:t>Supports analysis of </a:t>
-            </a:r>
-          </a:p>
-          <a:p>
-            <a:r>
-              <a:rPr lang="en-US" i="1" dirty="0">
-                <a:highlight>
-                  <a:srgbClr val="FFFF00"/>
-                </a:highlight>
-              </a:rPr>
-              <a:t>Utilization of Pre-computed amounts from University of Chicago</a:t>
-            </a:r>
-          </a:p>
-          <a:p>
-            <a:endParaRPr lang="en-US" dirty="0"/>
-          </a:p>
-        </p:txBody>
-      </p:sp>
-      <p:sp>
-        <p:nvSpPr>
-          <p:cNvPr id="4" name="Text Placeholder 3">
-            <a:extLst>
-              <a:ext uri="{FF2B5EF4-FFF2-40B4-BE49-F238E27FC236}">
-                <a16:creationId xmlns:a16="http://schemas.microsoft.com/office/drawing/2014/main" id="{37E36561-3222-4739-96C4-06B335CCA78B}"/>
-              </a:ext>
-            </a:extLst>
-          </p:cNvPr>
-          <p:cNvSpPr>
-            <a:spLocks noGrp="1"/>
-          </p:cNvSpPr>
-          <p:nvPr>
-            <p:ph type="body" sz="half" idx="2"/>
-          </p:nvPr>
-        </p:nvSpPr>
-        <p:spPr/>
-        <p:txBody>
-          <a:bodyPr/>
-          <a:lstStyle/>
-          <a:p>
-            <a:endParaRPr lang="en-US"/>
+              <a:rPr lang="en-US" sz="2400" dirty="0"/>
+              <a:t>Two Approaches:</a:t>
+            </a:r>
+          </a:p>
+          <a:p>
+            <a:pPr lvl="1"/>
+            <a:r>
+              <a:rPr lang="en-US" sz="2400" dirty="0"/>
+              <a:t>Point-to-Point</a:t>
+            </a:r>
+          </a:p>
+          <a:p>
+            <a:pPr lvl="1"/>
+            <a:r>
+              <a:rPr lang="en-US" sz="2400" dirty="0"/>
+              <a:t>Area-to-Area</a:t>
+            </a:r>
+          </a:p>
+          <a:p>
+            <a:pPr marL="502920" lvl="1" indent="0">
+              <a:buNone/>
+            </a:pPr>
+            <a:endParaRPr lang="en-US" dirty="0"/>
+          </a:p>
+          <a:p>
+            <a:r>
+              <a:rPr lang="en-US" sz="2400" dirty="0"/>
+              <a:t>Two Methods to Calculate</a:t>
+            </a:r>
+          </a:p>
+          <a:p>
+            <a:pPr lvl="1"/>
+            <a:r>
+              <a:rPr lang="en-US" sz="2400" dirty="0"/>
+              <a:t>Directly calculate with a tool such as </a:t>
+            </a:r>
+            <a:r>
+              <a:rPr lang="en-US" sz="2400" dirty="0" err="1"/>
+              <a:t>OpenTripPlanner</a:t>
+            </a:r>
+            <a:r>
+              <a:rPr lang="en-US" sz="2400" dirty="0"/>
+              <a:t> or </a:t>
+            </a:r>
+            <a:r>
+              <a:rPr lang="en-US" sz="2400" dirty="0" err="1"/>
+              <a:t>GoogleMaps</a:t>
+            </a:r>
+            <a:r>
+              <a:rPr lang="en-US" sz="2400" dirty="0"/>
+              <a:t> API</a:t>
+            </a:r>
+          </a:p>
+          <a:p>
+            <a:pPr lvl="1"/>
+            <a:r>
+              <a:rPr lang="en-US" sz="2400" dirty="0"/>
+              <a:t>Pre-computed travel times from University of Chicago*(only works with Area-to-Area)</a:t>
+            </a:r>
+          </a:p>
+          <a:p>
+            <a:endParaRPr lang="en-US" dirty="0"/>
           </a:p>
         </p:txBody>
       </p:sp>
     </p:spTree>
     <p:extLst>
       <p:ext uri="{BB962C8B-B14F-4D97-AF65-F5344CB8AC3E}">
-        <p14:creationId xmlns:p14="http://schemas.microsoft.com/office/powerpoint/2010/main" val="236543114"/>
+        <p14:creationId xmlns:p14="http://schemas.microsoft.com/office/powerpoint/2010/main" val="3074340298"/>
       </p:ext>
     </p:extLst>
   </p:cSld>
@@ -4616,7 +5037,7 @@
           <p:cNvPr id="2" name="Title 1">
             <a:extLst>
               <a:ext uri="{FF2B5EF4-FFF2-40B4-BE49-F238E27FC236}">
-                <a16:creationId xmlns:a16="http://schemas.microsoft.com/office/drawing/2014/main" id="{99D19D63-76FE-4AA3-9EB7-9F289AAC671C}"/>
+                <a16:creationId xmlns:a16="http://schemas.microsoft.com/office/drawing/2014/main" id="{D7CB8EAB-C9FE-476E-A057-9858F7A35A7B}"/>
               </a:ext>
             </a:extLst>
           </p:cNvPr>
@@ -4629,12 +5050,14 @@
         </p:nvSpPr>
         <p:spPr/>
         <p:txBody>
-          <a:bodyPr/>
-          <a:lstStyle/>
-          <a:p>
-            <a:r>
-              <a:rPr lang="en-US" dirty="0"/>
-              <a:t>Future Considerations</a:t>
+          <a:bodyPr>
+            <a:normAutofit/>
+          </a:bodyPr>
+          <a:lstStyle/>
+          <a:p>
+            <a:r>
+              <a:rPr lang="en-US" sz="3600" b="1" dirty="0"/>
+              <a:t>Application</a:t>
             </a:r>
           </a:p>
         </p:txBody>
@@ -4644,7 +5067,7 @@
           <p:cNvPr id="3" name="Content Placeholder 2">
             <a:extLst>
               <a:ext uri="{FF2B5EF4-FFF2-40B4-BE49-F238E27FC236}">
-                <a16:creationId xmlns:a16="http://schemas.microsoft.com/office/drawing/2014/main" id="{6A8089F9-F89C-4926-A5C7-6909BD500EFC}"/>
+                <a16:creationId xmlns:a16="http://schemas.microsoft.com/office/drawing/2014/main" id="{2F186D55-0609-4F0A-958C-96015A967471}"/>
               </a:ext>
             </a:extLst>
           </p:cNvPr>
@@ -4652,75 +5075,71 @@
             <a:spLocks noGrp="1"/>
           </p:cNvSpPr>
           <p:nvPr>
-            <p:ph sz="half" idx="1"/>
-          </p:nvPr>
-        </p:nvSpPr>
-        <p:spPr/>
-        <p:txBody>
-          <a:bodyPr/>
-          <a:lstStyle/>
-          <a:p>
-            <a:r>
-              <a:rPr lang="en-US" dirty="0"/>
-              <a:t>Incorporate weight options</a:t>
+            <p:ph idx="1"/>
+          </p:nvPr>
+        </p:nvSpPr>
+        <p:spPr/>
+        <p:txBody>
+          <a:bodyPr/>
+          <a:lstStyle/>
+          <a:p>
+            <a:pPr marL="0" indent="0">
+              <a:buNone/>
+            </a:pPr>
+            <a:endParaRPr lang="en-US" sz="2400" dirty="0"/>
+          </a:p>
+          <a:p>
+            <a:r>
+              <a:rPr lang="en-US" sz="2400" dirty="0"/>
+              <a:t>Current Structure</a:t>
             </a:r>
           </a:p>
           <a:p>
             <a:pPr lvl="1"/>
             <a:r>
-              <a:rPr lang="en-US" dirty="0"/>
-              <a:t>Weights between categories</a:t>
+              <a:rPr lang="en-US" sz="2400" dirty="0"/>
+              <a:t>Evaluate a set of communal resource</a:t>
             </a:r>
           </a:p>
           <a:p>
             <a:pPr lvl="1"/>
             <a:r>
-              <a:rPr lang="en-US" dirty="0"/>
-              <a:t>More rigorous analysis setup (e.g., the data is together – what more can we do)?</a:t>
+              <a:rPr lang="en-US" sz="2400" dirty="0"/>
+              <a:t>Scope is focused on PUMAs (Public Use Microdata Areas)</a:t>
+            </a:r>
+          </a:p>
+          <a:p>
+            <a:pPr lvl="2"/>
+            <a:r>
+              <a:rPr lang="en-US" sz="2000" dirty="0"/>
+              <a:t>Generally relate one-to-one with Community District with a few exceptions.</a:t>
             </a:r>
           </a:p>
           <a:p>
             <a:pPr lvl="1"/>
             <a:r>
-              <a:rPr lang="en-US" dirty="0"/>
-              <a:t>Allow for uploading of resources within </a:t>
-            </a:r>
-            <a:r>
-              <a:rPr lang="en-US"/>
-              <a:t>the application</a:t>
-            </a:r>
-          </a:p>
-        </p:txBody>
-      </p:sp>
-      <p:sp>
-        <p:nvSpPr>
-          <p:cNvPr id="4" name="Content Placeholder 3">
-            <a:extLst>
-              <a:ext uri="{FF2B5EF4-FFF2-40B4-BE49-F238E27FC236}">
-                <a16:creationId xmlns:a16="http://schemas.microsoft.com/office/drawing/2014/main" id="{3BE4A983-806A-4BAE-AB51-51ADCA13F7B4}"/>
-              </a:ext>
-            </a:extLst>
-          </p:cNvPr>
-          <p:cNvSpPr>
-            <a:spLocks noGrp="1"/>
-          </p:cNvSpPr>
-          <p:nvPr>
-            <p:ph sz="half" idx="2"/>
-          </p:nvPr>
-        </p:nvSpPr>
-        <p:spPr/>
-        <p:txBody>
-          <a:bodyPr/>
-          <a:lstStyle/>
-          <a:p>
-            <a:endParaRPr lang="en-US"/>
+              <a:rPr lang="en-US" sz="2400" dirty="0"/>
+              <a:t>Pre-computed mass transit times</a:t>
+            </a:r>
+          </a:p>
+          <a:p>
+            <a:r>
+              <a:rPr lang="en-US" sz="2600" dirty="0"/>
+              <a:t>Walkthrough</a:t>
+            </a:r>
+          </a:p>
+          <a:p>
+            <a:pPr marL="0" indent="0">
+              <a:buNone/>
+            </a:pPr>
+            <a:endParaRPr lang="en-US" dirty="0"/>
           </a:p>
         </p:txBody>
       </p:sp>
     </p:spTree>
     <p:extLst>
       <p:ext uri="{BB962C8B-B14F-4D97-AF65-F5344CB8AC3E}">
-        <p14:creationId xmlns:p14="http://schemas.microsoft.com/office/powerpoint/2010/main" val="3165296934"/>
+        <p14:creationId xmlns:p14="http://schemas.microsoft.com/office/powerpoint/2010/main" val="236543114"/>
       </p:ext>
     </p:extLst>
   </p:cSld>

</xml_diff>